<commit_message>
correction call of CleanLine
</commit_message>
<xml_diff>
--- a/dev/CleanLine.pptx
+++ b/dev/CleanLine.pptx
@@ -6,6 +6,9 @@
   </p:sldMasterIdLst>
   <p:sldIdLst>
     <p:sldId id="256" r:id="rId2"/>
+    <p:sldId id="257" r:id="rId3"/>
+    <p:sldId id="258" r:id="rId4"/>
+    <p:sldId id="259" r:id="rId5"/>
   </p:sldIdLst>
   <p:sldSz cx="12192000" cy="6858000"/>
   <p:notesSz cx="6858000" cy="9144000"/>
@@ -104,6 +107,11 @@
       </a:defRPr>
     </a:lvl9pPr>
   </p:defaultTextStyle>
+  <p:extLst>
+    <p:ext uri="{EFAFB233-063F-42B5-8137-9DF3F51BA10A}">
+      <p15:sldGuideLst xmlns:p15="http://schemas.microsoft.com/office/powerpoint/2012/main"/>
+    </p:ext>
+  </p:extLst>
 </p:presentation>
 </file>
 
@@ -256,7 +264,7 @@
           <a:p>
             <a:fld id="{9F6DF5C4-DF92-4FFA-BAF8-58BDC05026BF}" type="datetimeFigureOut">
               <a:rPr lang="fr-CH" smtClean="0"/>
-              <a:t>15.06.2025</a:t>
+              <a:t>16.06.2025</a:t>
             </a:fld>
             <a:endParaRPr lang="fr-CH"/>
           </a:p>
@@ -456,7 +464,7 @@
           <a:p>
             <a:fld id="{9F6DF5C4-DF92-4FFA-BAF8-58BDC05026BF}" type="datetimeFigureOut">
               <a:rPr lang="fr-CH" smtClean="0"/>
-              <a:t>15.06.2025</a:t>
+              <a:t>16.06.2025</a:t>
             </a:fld>
             <a:endParaRPr lang="fr-CH"/>
           </a:p>
@@ -666,7 +674,7 @@
           <a:p>
             <a:fld id="{9F6DF5C4-DF92-4FFA-BAF8-58BDC05026BF}" type="datetimeFigureOut">
               <a:rPr lang="fr-CH" smtClean="0"/>
-              <a:t>15.06.2025</a:t>
+              <a:t>16.06.2025</a:t>
             </a:fld>
             <a:endParaRPr lang="fr-CH"/>
           </a:p>
@@ -866,7 +874,7 @@
           <a:p>
             <a:fld id="{9F6DF5C4-DF92-4FFA-BAF8-58BDC05026BF}" type="datetimeFigureOut">
               <a:rPr lang="fr-CH" smtClean="0"/>
-              <a:t>15.06.2025</a:t>
+              <a:t>16.06.2025</a:t>
             </a:fld>
             <a:endParaRPr lang="fr-CH"/>
           </a:p>
@@ -1142,7 +1150,7 @@
           <a:p>
             <a:fld id="{9F6DF5C4-DF92-4FFA-BAF8-58BDC05026BF}" type="datetimeFigureOut">
               <a:rPr lang="fr-CH" smtClean="0"/>
-              <a:t>15.06.2025</a:t>
+              <a:t>16.06.2025</a:t>
             </a:fld>
             <a:endParaRPr lang="fr-CH"/>
           </a:p>
@@ -1410,7 +1418,7 @@
           <a:p>
             <a:fld id="{9F6DF5C4-DF92-4FFA-BAF8-58BDC05026BF}" type="datetimeFigureOut">
               <a:rPr lang="fr-CH" smtClean="0"/>
-              <a:t>15.06.2025</a:t>
+              <a:t>16.06.2025</a:t>
             </a:fld>
             <a:endParaRPr lang="fr-CH"/>
           </a:p>
@@ -1825,7 +1833,7 @@
           <a:p>
             <a:fld id="{9F6DF5C4-DF92-4FFA-BAF8-58BDC05026BF}" type="datetimeFigureOut">
               <a:rPr lang="fr-CH" smtClean="0"/>
-              <a:t>15.06.2025</a:t>
+              <a:t>16.06.2025</a:t>
             </a:fld>
             <a:endParaRPr lang="fr-CH"/>
           </a:p>
@@ -1967,7 +1975,7 @@
           <a:p>
             <a:fld id="{9F6DF5C4-DF92-4FFA-BAF8-58BDC05026BF}" type="datetimeFigureOut">
               <a:rPr lang="fr-CH" smtClean="0"/>
-              <a:t>15.06.2025</a:t>
+              <a:t>16.06.2025</a:t>
             </a:fld>
             <a:endParaRPr lang="fr-CH"/>
           </a:p>
@@ -2080,7 +2088,7 @@
           <a:p>
             <a:fld id="{9F6DF5C4-DF92-4FFA-BAF8-58BDC05026BF}" type="datetimeFigureOut">
               <a:rPr lang="fr-CH" smtClean="0"/>
-              <a:t>15.06.2025</a:t>
+              <a:t>16.06.2025</a:t>
             </a:fld>
             <a:endParaRPr lang="fr-CH"/>
           </a:p>
@@ -2393,7 +2401,7 @@
           <a:p>
             <a:fld id="{9F6DF5C4-DF92-4FFA-BAF8-58BDC05026BF}" type="datetimeFigureOut">
               <a:rPr lang="fr-CH" smtClean="0"/>
-              <a:t>15.06.2025</a:t>
+              <a:t>16.06.2025</a:t>
             </a:fld>
             <a:endParaRPr lang="fr-CH"/>
           </a:p>
@@ -2682,7 +2690,7 @@
           <a:p>
             <a:fld id="{9F6DF5C4-DF92-4FFA-BAF8-58BDC05026BF}" type="datetimeFigureOut">
               <a:rPr lang="fr-CH" smtClean="0"/>
-              <a:t>15.06.2025</a:t>
+              <a:t>16.06.2025</a:t>
             </a:fld>
             <a:endParaRPr lang="fr-CH"/>
           </a:p>
@@ -2925,7 +2933,7 @@
           <a:p>
             <a:fld id="{9F6DF5C4-DF92-4FFA-BAF8-58BDC05026BF}" type="datetimeFigureOut">
               <a:rPr lang="fr-CH" smtClean="0"/>
-              <a:t>15.06.2025</a:t>
+              <a:t>16.06.2025</a:t>
             </a:fld>
             <a:endParaRPr lang="fr-CH"/>
           </a:p>
@@ -3572,6 +3580,1231 @@
 </p:sld>
 </file>
 
+<file path=ppt/slides/slide2.xml><?xml version="1.0" encoding="utf-8"?>
+<p:sld xmlns:a="http://schemas.openxmlformats.org/drawingml/2006/main" xmlns:r="http://schemas.openxmlformats.org/officeDocument/2006/relationships" xmlns:p="http://schemas.openxmlformats.org/presentationml/2006/main">
+  <p:cSld>
+    <p:spTree>
+      <p:nvGrpSpPr>
+        <p:cNvPr id="1" name=""/>
+        <p:cNvGrpSpPr/>
+        <p:nvPr/>
+      </p:nvGrpSpPr>
+      <p:grpSpPr>
+        <a:xfrm>
+          <a:off x="0" y="0"/>
+          <a:ext cx="0" cy="0"/>
+          <a:chOff x="0" y="0"/>
+          <a:chExt cx="0" cy="0"/>
+        </a:xfrm>
+      </p:grpSpPr>
+      <p:pic>
+        <p:nvPicPr>
+          <p:cNvPr id="5" name="Picture 4">
+            <a:extLst>
+              <a:ext uri="{FF2B5EF4-FFF2-40B4-BE49-F238E27FC236}">
+                <a16:creationId xmlns:a16="http://schemas.microsoft.com/office/drawing/2014/main" id="{6286D5C9-FCF6-0D4E-2679-7B6806C04AB0}"/>
+              </a:ext>
+            </a:extLst>
+          </p:cNvPr>
+          <p:cNvPicPr>
+            <a:picLocks noChangeAspect="1"/>
+          </p:cNvPicPr>
+          <p:nvPr/>
+        </p:nvPicPr>
+        <p:blipFill>
+          <a:blip r:embed="rId2"/>
+          <a:stretch>
+            <a:fillRect/>
+          </a:stretch>
+        </p:blipFill>
+        <p:spPr>
+          <a:xfrm>
+            <a:off x="200627" y="0"/>
+            <a:ext cx="4068035" cy="3319613"/>
+          </a:xfrm>
+          <a:prstGeom prst="rect">
+            <a:avLst/>
+          </a:prstGeom>
+        </p:spPr>
+      </p:pic>
+      <p:pic>
+        <p:nvPicPr>
+          <p:cNvPr id="7" name="Picture 6">
+            <a:extLst>
+              <a:ext uri="{FF2B5EF4-FFF2-40B4-BE49-F238E27FC236}">
+                <a16:creationId xmlns:a16="http://schemas.microsoft.com/office/drawing/2014/main" id="{E6C897AC-A048-D2EA-2548-E825A149B29A}"/>
+              </a:ext>
+            </a:extLst>
+          </p:cNvPr>
+          <p:cNvPicPr>
+            <a:picLocks noChangeAspect="1"/>
+          </p:cNvPicPr>
+          <p:nvPr/>
+        </p:nvPicPr>
+        <p:blipFill>
+          <a:blip r:embed="rId3"/>
+          <a:stretch>
+            <a:fillRect/>
+          </a:stretch>
+        </p:blipFill>
+        <p:spPr>
+          <a:xfrm>
+            <a:off x="5494087" y="24905"/>
+            <a:ext cx="5496692" cy="333422"/>
+          </a:xfrm>
+          <a:prstGeom prst="rect">
+            <a:avLst/>
+          </a:prstGeom>
+        </p:spPr>
+      </p:pic>
+      <p:pic>
+        <p:nvPicPr>
+          <p:cNvPr id="9" name="Picture 8">
+            <a:extLst>
+              <a:ext uri="{FF2B5EF4-FFF2-40B4-BE49-F238E27FC236}">
+                <a16:creationId xmlns:a16="http://schemas.microsoft.com/office/drawing/2014/main" id="{F6A27817-4886-2268-70DF-7CC7AB5C33BD}"/>
+              </a:ext>
+            </a:extLst>
+          </p:cNvPr>
+          <p:cNvPicPr>
+            <a:picLocks noChangeAspect="1"/>
+          </p:cNvPicPr>
+          <p:nvPr/>
+        </p:nvPicPr>
+        <p:blipFill>
+          <a:blip r:embed="rId4"/>
+          <a:stretch>
+            <a:fillRect/>
+          </a:stretch>
+        </p:blipFill>
+        <p:spPr>
+          <a:xfrm>
+            <a:off x="5620512" y="691749"/>
+            <a:ext cx="2170176" cy="2133214"/>
+          </a:xfrm>
+          <a:prstGeom prst="rect">
+            <a:avLst/>
+          </a:prstGeom>
+        </p:spPr>
+      </p:pic>
+      <p:sp>
+        <p:nvSpPr>
+          <p:cNvPr id="10" name="TextBox 9">
+            <a:extLst>
+              <a:ext uri="{FF2B5EF4-FFF2-40B4-BE49-F238E27FC236}">
+                <a16:creationId xmlns:a16="http://schemas.microsoft.com/office/drawing/2014/main" id="{B9558F21-DA3A-D3A7-5C91-16F990580943}"/>
+              </a:ext>
+            </a:extLst>
+          </p:cNvPr>
+          <p:cNvSpPr txBox="1"/>
+          <p:nvPr/>
+        </p:nvSpPr>
+        <p:spPr>
+          <a:xfrm>
+            <a:off x="5124044" y="358327"/>
+            <a:ext cx="6867329" cy="369332"/>
+          </a:xfrm>
+          <a:prstGeom prst="rect">
+            <a:avLst/>
+          </a:prstGeom>
+          <a:noFill/>
+        </p:spPr>
+        <p:txBody>
+          <a:bodyPr wrap="none" rtlCol="0">
+            <a:spAutoFit/>
+          </a:bodyPr>
+          <a:lstStyle/>
+          <a:p>
+            <a:r>
+              <a:rPr lang="fr-FR" dirty="0"/>
+              <a:t>EEG c’est une structure classique </a:t>
+            </a:r>
+            <a:r>
+              <a:rPr lang="fr-FR" dirty="0" err="1"/>
+              <a:t>eeglab</a:t>
+            </a:r>
+            <a:r>
+              <a:rPr lang="fr-FR" dirty="0"/>
+              <a:t> et g ce sont les arguments</a:t>
+            </a:r>
+            <a:endParaRPr lang="fr-CH" dirty="0"/>
+          </a:p>
+        </p:txBody>
+      </p:sp>
+      <p:sp>
+        <p:nvSpPr>
+          <p:cNvPr id="11" name="TextBox 10">
+            <a:extLst>
+              <a:ext uri="{FF2B5EF4-FFF2-40B4-BE49-F238E27FC236}">
+                <a16:creationId xmlns:a16="http://schemas.microsoft.com/office/drawing/2014/main" id="{E35B1015-0FB0-2BEC-E6CA-FFF899515014}"/>
+              </a:ext>
+            </a:extLst>
+          </p:cNvPr>
+          <p:cNvSpPr txBox="1"/>
+          <p:nvPr/>
+        </p:nvSpPr>
+        <p:spPr>
+          <a:xfrm>
+            <a:off x="504684" y="3319613"/>
+            <a:ext cx="10231655" cy="1200329"/>
+          </a:xfrm>
+          <a:prstGeom prst="rect">
+            <a:avLst/>
+          </a:prstGeom>
+          <a:noFill/>
+        </p:spPr>
+        <p:txBody>
+          <a:bodyPr wrap="square" rtlCol="0">
+            <a:spAutoFit/>
+          </a:bodyPr>
+          <a:lstStyle/>
+          <a:p>
+            <a:r>
+              <a:rPr lang="fr-FR" dirty="0"/>
+              <a:t>ATTENTION: ce code </a:t>
+            </a:r>
+            <a:r>
+              <a:rPr lang="fr-FR" dirty="0" err="1"/>
+              <a:t>execute</a:t>
+            </a:r>
+            <a:r>
+              <a:rPr lang="fr-FR" dirty="0"/>
+              <a:t> l’ancienne version car </a:t>
+            </a:r>
+            <a:r>
+              <a:rPr lang="fr-FR" dirty="0" err="1"/>
+              <a:t>newversion</a:t>
+            </a:r>
+            <a:r>
+              <a:rPr lang="fr-FR" dirty="0"/>
+              <a:t> est = 0, </a:t>
+            </a:r>
+          </a:p>
+          <a:p>
+            <a:endParaRPr lang="fr-FR" dirty="0"/>
+          </a:p>
+          <a:p>
+            <a:r>
+              <a:rPr lang="fr-FR" dirty="0"/>
+              <a:t>La </a:t>
+            </a:r>
+            <a:r>
+              <a:rPr lang="fr-FR" dirty="0" err="1"/>
+              <a:t>nouvlle</a:t>
+            </a:r>
+            <a:r>
+              <a:rPr lang="fr-FR" dirty="0"/>
+              <a:t> version du code qui était utiliser par Michael c’est bien la fonction : </a:t>
+            </a:r>
+          </a:p>
+          <a:p>
+            <a:r>
+              <a:rPr lang="fr-CH" dirty="0" err="1"/>
+              <a:t>cleanLineNoise.m</a:t>
+            </a:r>
+            <a:r>
+              <a:rPr lang="fr-CH" dirty="0"/>
+              <a:t> et pas </a:t>
+            </a:r>
+            <a:r>
+              <a:rPr lang="fr-CH" dirty="0" err="1"/>
+              <a:t>cleanLine.m</a:t>
+            </a:r>
+            <a:endParaRPr lang="fr-CH" dirty="0"/>
+          </a:p>
+        </p:txBody>
+      </p:sp>
+      <p:pic>
+        <p:nvPicPr>
+          <p:cNvPr id="13" name="Picture 12">
+            <a:extLst>
+              <a:ext uri="{FF2B5EF4-FFF2-40B4-BE49-F238E27FC236}">
+                <a16:creationId xmlns:a16="http://schemas.microsoft.com/office/drawing/2014/main" id="{71113E50-C665-94FF-1D9E-5566E1634D60}"/>
+              </a:ext>
+            </a:extLst>
+          </p:cNvPr>
+          <p:cNvPicPr>
+            <a:picLocks noChangeAspect="1"/>
+          </p:cNvPicPr>
+          <p:nvPr/>
+        </p:nvPicPr>
+        <p:blipFill>
+          <a:blip r:embed="rId5"/>
+          <a:stretch>
+            <a:fillRect/>
+          </a:stretch>
+        </p:blipFill>
+        <p:spPr>
+          <a:xfrm>
+            <a:off x="290276" y="4643065"/>
+            <a:ext cx="3381847" cy="371527"/>
+          </a:xfrm>
+          <a:prstGeom prst="rect">
+            <a:avLst/>
+          </a:prstGeom>
+        </p:spPr>
+      </p:pic>
+      <p:pic>
+        <p:nvPicPr>
+          <p:cNvPr id="15" name="Picture 14">
+            <a:extLst>
+              <a:ext uri="{FF2B5EF4-FFF2-40B4-BE49-F238E27FC236}">
+                <a16:creationId xmlns:a16="http://schemas.microsoft.com/office/drawing/2014/main" id="{59599DDD-464D-315B-D7D9-9815B1091D88}"/>
+              </a:ext>
+            </a:extLst>
+          </p:cNvPr>
+          <p:cNvPicPr>
+            <a:picLocks noChangeAspect="1"/>
+          </p:cNvPicPr>
+          <p:nvPr/>
+        </p:nvPicPr>
+        <p:blipFill>
+          <a:blip r:embed="rId6"/>
+          <a:stretch>
+            <a:fillRect/>
+          </a:stretch>
+        </p:blipFill>
+        <p:spPr>
+          <a:xfrm>
+            <a:off x="4439119" y="4501372"/>
+            <a:ext cx="3479585" cy="2356628"/>
+          </a:xfrm>
+          <a:prstGeom prst="rect">
+            <a:avLst/>
+          </a:prstGeom>
+        </p:spPr>
+      </p:pic>
+      <p:sp>
+        <p:nvSpPr>
+          <p:cNvPr id="16" name="Rectangle 15">
+            <a:extLst>
+              <a:ext uri="{FF2B5EF4-FFF2-40B4-BE49-F238E27FC236}">
+                <a16:creationId xmlns:a16="http://schemas.microsoft.com/office/drawing/2014/main" id="{3973F869-1BCF-3D38-C573-739040372016}"/>
+              </a:ext>
+            </a:extLst>
+          </p:cNvPr>
+          <p:cNvSpPr/>
+          <p:nvPr/>
+        </p:nvSpPr>
+        <p:spPr>
+          <a:xfrm>
+            <a:off x="0" y="3849624"/>
+            <a:ext cx="8577072" cy="2983471"/>
+          </a:xfrm>
+          <a:prstGeom prst="rect">
+            <a:avLst/>
+          </a:prstGeom>
+          <a:noFill/>
+          <a:ln>
+            <a:solidFill>
+              <a:srgbClr val="FF0000"/>
+            </a:solidFill>
+          </a:ln>
+        </p:spPr>
+        <p:style>
+          <a:lnRef idx="2">
+            <a:schemeClr val="accent1">
+              <a:shade val="15000"/>
+            </a:schemeClr>
+          </a:lnRef>
+          <a:fillRef idx="1">
+            <a:schemeClr val="accent1"/>
+          </a:fillRef>
+          <a:effectRef idx="0">
+            <a:schemeClr val="accent1"/>
+          </a:effectRef>
+          <a:fontRef idx="minor">
+            <a:schemeClr val="lt1"/>
+          </a:fontRef>
+        </p:style>
+        <p:txBody>
+          <a:bodyPr rtlCol="0" anchor="ctr"/>
+          <a:lstStyle/>
+          <a:p>
+            <a:pPr algn="ctr"/>
+            <a:endParaRPr lang="fr-CH"/>
+          </a:p>
+        </p:txBody>
+      </p:sp>
+      <p:sp>
+        <p:nvSpPr>
+          <p:cNvPr id="17" name="TextBox 16">
+            <a:extLst>
+              <a:ext uri="{FF2B5EF4-FFF2-40B4-BE49-F238E27FC236}">
+                <a16:creationId xmlns:a16="http://schemas.microsoft.com/office/drawing/2014/main" id="{C402F700-8656-DE8B-5532-2D57D0043C35}"/>
+              </a:ext>
+            </a:extLst>
+          </p:cNvPr>
+          <p:cNvSpPr txBox="1"/>
+          <p:nvPr/>
+        </p:nvSpPr>
+        <p:spPr>
+          <a:xfrm>
+            <a:off x="8769096" y="3849624"/>
+            <a:ext cx="3222277" cy="646331"/>
+          </a:xfrm>
+          <a:prstGeom prst="rect">
+            <a:avLst/>
+          </a:prstGeom>
+          <a:noFill/>
+        </p:spPr>
+        <p:txBody>
+          <a:bodyPr wrap="square" rtlCol="0">
+            <a:spAutoFit/>
+          </a:bodyPr>
+          <a:lstStyle/>
+          <a:p>
+            <a:r>
+              <a:rPr lang="fr-FR" dirty="0">
+                <a:solidFill>
+                  <a:srgbClr val="FF0000"/>
+                </a:solidFill>
+              </a:rPr>
+              <a:t>C’est cette version qui a été choisi par </a:t>
+            </a:r>
+            <a:r>
+              <a:rPr lang="fr-FR" dirty="0" err="1">
+                <a:solidFill>
+                  <a:srgbClr val="FF0000"/>
+                </a:solidFill>
+              </a:rPr>
+              <a:t>MichaelDP</a:t>
+            </a:r>
+            <a:endParaRPr lang="fr-CH" dirty="0">
+              <a:solidFill>
+                <a:srgbClr val="FF0000"/>
+              </a:solidFill>
+            </a:endParaRPr>
+          </a:p>
+        </p:txBody>
+      </p:sp>
+      <p:sp>
+        <p:nvSpPr>
+          <p:cNvPr id="18" name="TextBox 17">
+            <a:extLst>
+              <a:ext uri="{FF2B5EF4-FFF2-40B4-BE49-F238E27FC236}">
+                <a16:creationId xmlns:a16="http://schemas.microsoft.com/office/drawing/2014/main" id="{829CC2A1-2A2D-1590-9BD5-E3D487659BF7}"/>
+              </a:ext>
+            </a:extLst>
+          </p:cNvPr>
+          <p:cNvSpPr txBox="1"/>
+          <p:nvPr/>
+        </p:nvSpPr>
+        <p:spPr>
+          <a:xfrm>
+            <a:off x="504684" y="5534526"/>
+            <a:ext cx="3694345" cy="369332"/>
+          </a:xfrm>
+          <a:prstGeom prst="rect">
+            <a:avLst/>
+          </a:prstGeom>
+          <a:noFill/>
+        </p:spPr>
+        <p:txBody>
+          <a:bodyPr wrap="none" rtlCol="0">
+            <a:spAutoFit/>
+          </a:bodyPr>
+          <a:lstStyle/>
+          <a:p>
+            <a:r>
+              <a:rPr lang="fr-FR" dirty="0"/>
+              <a:t>Il faut une structure </a:t>
+            </a:r>
+            <a:r>
+              <a:rPr lang="fr-FR" dirty="0" err="1"/>
+              <a:t>eeglab</a:t>
+            </a:r>
+            <a:r>
+              <a:rPr lang="fr-FR" dirty="0"/>
+              <a:t> en input</a:t>
+            </a:r>
+            <a:endParaRPr lang="fr-CH" dirty="0"/>
+          </a:p>
+        </p:txBody>
+      </p:sp>
+      <p:cxnSp>
+        <p:nvCxnSpPr>
+          <p:cNvPr id="20" name="Straight Connector 19">
+            <a:extLst>
+              <a:ext uri="{FF2B5EF4-FFF2-40B4-BE49-F238E27FC236}">
+                <a16:creationId xmlns:a16="http://schemas.microsoft.com/office/drawing/2014/main" id="{DA92D652-B1DD-26DC-EA54-884A84F0B49A}"/>
+              </a:ext>
+            </a:extLst>
+          </p:cNvPr>
+          <p:cNvCxnSpPr/>
+          <p:nvPr/>
+        </p:nvCxnSpPr>
+        <p:spPr>
+          <a:xfrm flipV="1">
+            <a:off x="77002" y="0"/>
+            <a:ext cx="11348185" cy="3319613"/>
+          </a:xfrm>
+          <a:prstGeom prst="line">
+            <a:avLst/>
+          </a:prstGeom>
+        </p:spPr>
+        <p:style>
+          <a:lnRef idx="2">
+            <a:schemeClr val="accent2"/>
+          </a:lnRef>
+          <a:fillRef idx="0">
+            <a:schemeClr val="accent2"/>
+          </a:fillRef>
+          <a:effectRef idx="1">
+            <a:schemeClr val="accent2"/>
+          </a:effectRef>
+          <a:fontRef idx="minor">
+            <a:schemeClr val="tx1"/>
+          </a:fontRef>
+        </p:style>
+      </p:cxnSp>
+    </p:spTree>
+    <p:extLst>
+      <p:ext uri="{BB962C8B-B14F-4D97-AF65-F5344CB8AC3E}">
+        <p14:creationId xmlns:p14="http://schemas.microsoft.com/office/powerpoint/2010/main" val="3964182331"/>
+      </p:ext>
+    </p:extLst>
+  </p:cSld>
+  <p:clrMapOvr>
+    <a:masterClrMapping/>
+  </p:clrMapOvr>
+</p:sld>
+</file>
+
+<file path=ppt/slides/slide3.xml><?xml version="1.0" encoding="utf-8"?>
+<p:sld xmlns:a="http://schemas.openxmlformats.org/drawingml/2006/main" xmlns:r="http://schemas.openxmlformats.org/officeDocument/2006/relationships" xmlns:p="http://schemas.openxmlformats.org/presentationml/2006/main">
+  <p:cSld>
+    <p:spTree>
+      <p:nvGrpSpPr>
+        <p:cNvPr id="1" name=""/>
+        <p:cNvGrpSpPr/>
+        <p:nvPr/>
+      </p:nvGrpSpPr>
+      <p:grpSpPr>
+        <a:xfrm>
+          <a:off x="0" y="0"/>
+          <a:ext cx="0" cy="0"/>
+          <a:chOff x="0" y="0"/>
+          <a:chExt cx="0" cy="0"/>
+        </a:xfrm>
+      </p:grpSpPr>
+      <p:pic>
+        <p:nvPicPr>
+          <p:cNvPr id="7" name="Picture 6">
+            <a:extLst>
+              <a:ext uri="{FF2B5EF4-FFF2-40B4-BE49-F238E27FC236}">
+                <a16:creationId xmlns:a16="http://schemas.microsoft.com/office/drawing/2014/main" id="{67797568-9AB3-AF39-C86C-BA1A875EA121}"/>
+              </a:ext>
+            </a:extLst>
+          </p:cNvPr>
+          <p:cNvPicPr>
+            <a:picLocks noChangeAspect="1"/>
+          </p:cNvPicPr>
+          <p:nvPr/>
+        </p:nvPicPr>
+        <p:blipFill>
+          <a:blip r:embed="rId2"/>
+          <a:srcRect t="14334"/>
+          <a:stretch>
+            <a:fillRect/>
+          </a:stretch>
+        </p:blipFill>
+        <p:spPr>
+          <a:xfrm>
+            <a:off x="149946" y="885523"/>
+            <a:ext cx="6822338" cy="4514249"/>
+          </a:xfrm>
+          <a:prstGeom prst="rect">
+            <a:avLst/>
+          </a:prstGeom>
+        </p:spPr>
+      </p:pic>
+      <p:pic>
+        <p:nvPicPr>
+          <p:cNvPr id="9" name="Picture 8">
+            <a:extLst>
+              <a:ext uri="{FF2B5EF4-FFF2-40B4-BE49-F238E27FC236}">
+                <a16:creationId xmlns:a16="http://schemas.microsoft.com/office/drawing/2014/main" id="{A9583D90-6A1F-B9E9-1C07-94E6A63C8EF8}"/>
+              </a:ext>
+            </a:extLst>
+          </p:cNvPr>
+          <p:cNvPicPr>
+            <a:picLocks noChangeAspect="1"/>
+          </p:cNvPicPr>
+          <p:nvPr/>
+        </p:nvPicPr>
+        <p:blipFill>
+          <a:blip r:embed="rId3"/>
+          <a:stretch>
+            <a:fillRect/>
+          </a:stretch>
+        </p:blipFill>
+        <p:spPr>
+          <a:xfrm>
+            <a:off x="6549360" y="374213"/>
+            <a:ext cx="5761351" cy="5097135"/>
+          </a:xfrm>
+          <a:prstGeom prst="rect">
+            <a:avLst/>
+          </a:prstGeom>
+        </p:spPr>
+      </p:pic>
+      <p:pic>
+        <p:nvPicPr>
+          <p:cNvPr id="11" name="Picture 10">
+            <a:extLst>
+              <a:ext uri="{FF2B5EF4-FFF2-40B4-BE49-F238E27FC236}">
+                <a16:creationId xmlns:a16="http://schemas.microsoft.com/office/drawing/2014/main" id="{0058C281-1640-FF2A-B00E-C908360FEBB5}"/>
+              </a:ext>
+            </a:extLst>
+          </p:cNvPr>
+          <p:cNvPicPr>
+            <a:picLocks noChangeAspect="1"/>
+          </p:cNvPicPr>
+          <p:nvPr/>
+        </p:nvPicPr>
+        <p:blipFill>
+          <a:blip r:embed="rId4"/>
+          <a:stretch>
+            <a:fillRect/>
+          </a:stretch>
+        </p:blipFill>
+        <p:spPr>
+          <a:xfrm>
+            <a:off x="5226518" y="5411310"/>
+            <a:ext cx="6287235" cy="1446690"/>
+          </a:xfrm>
+          <a:prstGeom prst="rect">
+            <a:avLst/>
+          </a:prstGeom>
+        </p:spPr>
+      </p:pic>
+      <p:sp>
+        <p:nvSpPr>
+          <p:cNvPr id="12" name="TextBox 11">
+            <a:extLst>
+              <a:ext uri="{FF2B5EF4-FFF2-40B4-BE49-F238E27FC236}">
+                <a16:creationId xmlns:a16="http://schemas.microsoft.com/office/drawing/2014/main" id="{7A08587D-A8BE-A1D4-462B-65A76972C971}"/>
+              </a:ext>
+            </a:extLst>
+          </p:cNvPr>
+          <p:cNvSpPr txBox="1"/>
+          <p:nvPr/>
+        </p:nvSpPr>
+        <p:spPr>
+          <a:xfrm>
+            <a:off x="8104471" y="0"/>
+            <a:ext cx="2057230" cy="369332"/>
+          </a:xfrm>
+          <a:prstGeom prst="rect">
+            <a:avLst/>
+          </a:prstGeom>
+          <a:noFill/>
+        </p:spPr>
+        <p:txBody>
+          <a:bodyPr wrap="none" rtlCol="0">
+            <a:spAutoFit/>
+          </a:bodyPr>
+          <a:lstStyle/>
+          <a:p>
+            <a:r>
+              <a:rPr lang="fr-FR" dirty="0"/>
+              <a:t>Quel est le mieux ?</a:t>
+            </a:r>
+            <a:endParaRPr lang="fr-CH" dirty="0"/>
+          </a:p>
+        </p:txBody>
+      </p:sp>
+      <p:sp>
+        <p:nvSpPr>
+          <p:cNvPr id="13" name="TextBox 12">
+            <a:extLst>
+              <a:ext uri="{FF2B5EF4-FFF2-40B4-BE49-F238E27FC236}">
+                <a16:creationId xmlns:a16="http://schemas.microsoft.com/office/drawing/2014/main" id="{8696654D-CFAD-217C-7624-3AB4A41C3D26}"/>
+              </a:ext>
+            </a:extLst>
+          </p:cNvPr>
+          <p:cNvSpPr txBox="1"/>
+          <p:nvPr/>
+        </p:nvSpPr>
+        <p:spPr>
+          <a:xfrm>
+            <a:off x="644893" y="779646"/>
+            <a:ext cx="5249194" cy="369332"/>
+          </a:xfrm>
+          <a:prstGeom prst="rect">
+            <a:avLst/>
+          </a:prstGeom>
+          <a:noFill/>
+        </p:spPr>
+        <p:txBody>
+          <a:bodyPr wrap="none" rtlCol="0">
+            <a:spAutoFit/>
+          </a:bodyPr>
+          <a:lstStyle/>
+          <a:p>
+            <a:r>
+              <a:rPr lang="fr-FR" dirty="0"/>
+              <a:t>Quel est la différence entre </a:t>
+            </a:r>
+            <a:r>
+              <a:rPr lang="fr-FR" dirty="0" err="1"/>
+              <a:t>cleanline</a:t>
+            </a:r>
+            <a:r>
+              <a:rPr lang="fr-FR" dirty="0"/>
+              <a:t> et </a:t>
+            </a:r>
+            <a:r>
+              <a:rPr lang="fr-FR" dirty="0" err="1"/>
+              <a:t>cleanNoise</a:t>
+            </a:r>
+            <a:endParaRPr lang="fr-CH" dirty="0"/>
+          </a:p>
+        </p:txBody>
+      </p:sp>
+    </p:spTree>
+    <p:extLst>
+      <p:ext uri="{BB962C8B-B14F-4D97-AF65-F5344CB8AC3E}">
+        <p14:creationId xmlns:p14="http://schemas.microsoft.com/office/powerpoint/2010/main" val="3026252415"/>
+      </p:ext>
+    </p:extLst>
+  </p:cSld>
+  <p:clrMapOvr>
+    <a:masterClrMapping/>
+  </p:clrMapOvr>
+</p:sld>
+</file>
+
+<file path=ppt/slides/slide4.xml><?xml version="1.0" encoding="utf-8"?>
+<p:sld xmlns:a="http://schemas.openxmlformats.org/drawingml/2006/main" xmlns:r="http://schemas.openxmlformats.org/officeDocument/2006/relationships" xmlns:p="http://schemas.openxmlformats.org/presentationml/2006/main">
+  <p:cSld>
+    <p:spTree>
+      <p:nvGrpSpPr>
+        <p:cNvPr id="1" name=""/>
+        <p:cNvGrpSpPr/>
+        <p:nvPr/>
+      </p:nvGrpSpPr>
+      <p:grpSpPr>
+        <a:xfrm>
+          <a:off x="0" y="0"/>
+          <a:ext cx="0" cy="0"/>
+          <a:chOff x="0" y="0"/>
+          <a:chExt cx="0" cy="0"/>
+        </a:xfrm>
+      </p:grpSpPr>
+      <p:sp>
+        <p:nvSpPr>
+          <p:cNvPr id="5" name="TextBox 4">
+            <a:extLst>
+              <a:ext uri="{FF2B5EF4-FFF2-40B4-BE49-F238E27FC236}">
+                <a16:creationId xmlns:a16="http://schemas.microsoft.com/office/drawing/2014/main" id="{BF118E90-4A44-9B30-F246-AD30965633F8}"/>
+              </a:ext>
+            </a:extLst>
+          </p:cNvPr>
+          <p:cNvSpPr txBox="1"/>
+          <p:nvPr/>
+        </p:nvSpPr>
+        <p:spPr>
+          <a:xfrm>
+            <a:off x="877824" y="429768"/>
+            <a:ext cx="1128835" cy="369332"/>
+          </a:xfrm>
+          <a:prstGeom prst="rect">
+            <a:avLst/>
+          </a:prstGeom>
+          <a:noFill/>
+        </p:spPr>
+        <p:txBody>
+          <a:bodyPr wrap="none" rtlCol="0">
+            <a:spAutoFit/>
+          </a:bodyPr>
+          <a:lstStyle/>
+          <a:p>
+            <a:r>
+              <a:rPr lang="fr-FR" dirty="0" err="1"/>
+              <a:t>Redo</a:t>
+            </a:r>
+            <a:r>
+              <a:rPr lang="fr-FR" dirty="0"/>
+              <a:t> GUI</a:t>
+            </a:r>
+            <a:endParaRPr lang="fr-CH" dirty="0"/>
+          </a:p>
+        </p:txBody>
+      </p:sp>
+      <p:pic>
+        <p:nvPicPr>
+          <p:cNvPr id="11" name="Picture 10">
+            <a:extLst>
+              <a:ext uri="{FF2B5EF4-FFF2-40B4-BE49-F238E27FC236}">
+                <a16:creationId xmlns:a16="http://schemas.microsoft.com/office/drawing/2014/main" id="{AA9725F9-26DA-BE1F-B218-81F49532FB1D}"/>
+              </a:ext>
+            </a:extLst>
+          </p:cNvPr>
+          <p:cNvPicPr>
+            <a:picLocks noChangeAspect="1"/>
+          </p:cNvPicPr>
+          <p:nvPr/>
+        </p:nvPicPr>
+        <p:blipFill>
+          <a:blip r:embed="rId2"/>
+          <a:stretch>
+            <a:fillRect/>
+          </a:stretch>
+        </p:blipFill>
+        <p:spPr>
+          <a:xfrm>
+            <a:off x="411735" y="924663"/>
+            <a:ext cx="6382641" cy="5220429"/>
+          </a:xfrm>
+          <a:prstGeom prst="rect">
+            <a:avLst/>
+          </a:prstGeom>
+        </p:spPr>
+      </p:pic>
+      <p:pic>
+        <p:nvPicPr>
+          <p:cNvPr id="13" name="Picture 12">
+            <a:extLst>
+              <a:ext uri="{FF2B5EF4-FFF2-40B4-BE49-F238E27FC236}">
+                <a16:creationId xmlns:a16="http://schemas.microsoft.com/office/drawing/2014/main" id="{D10345C3-47E4-31D6-0501-02BEAEF561A3}"/>
+              </a:ext>
+            </a:extLst>
+          </p:cNvPr>
+          <p:cNvPicPr>
+            <a:picLocks noChangeAspect="1"/>
+          </p:cNvPicPr>
+          <p:nvPr/>
+        </p:nvPicPr>
+        <p:blipFill>
+          <a:blip r:embed="rId3"/>
+          <a:stretch>
+            <a:fillRect/>
+          </a:stretch>
+        </p:blipFill>
+        <p:spPr>
+          <a:xfrm>
+            <a:off x="7139725" y="1600849"/>
+            <a:ext cx="4515480" cy="2905530"/>
+          </a:xfrm>
+          <a:prstGeom prst="rect">
+            <a:avLst/>
+          </a:prstGeom>
+        </p:spPr>
+      </p:pic>
+      <p:cxnSp>
+        <p:nvCxnSpPr>
+          <p:cNvPr id="15" name="Straight Arrow Connector 14">
+            <a:extLst>
+              <a:ext uri="{FF2B5EF4-FFF2-40B4-BE49-F238E27FC236}">
+                <a16:creationId xmlns:a16="http://schemas.microsoft.com/office/drawing/2014/main" id="{B4AEFF92-343A-4EEC-CBF7-C1714B51F08B}"/>
+              </a:ext>
+            </a:extLst>
+          </p:cNvPr>
+          <p:cNvCxnSpPr>
+            <a:cxnSpLocks/>
+          </p:cNvCxnSpPr>
+          <p:nvPr/>
+        </p:nvCxnSpPr>
+        <p:spPr>
+          <a:xfrm flipH="1" flipV="1">
+            <a:off x="6419088" y="2267712"/>
+            <a:ext cx="720637" cy="940388"/>
+          </a:xfrm>
+          <a:prstGeom prst="straightConnector1">
+            <a:avLst/>
+          </a:prstGeom>
+          <a:ln>
+            <a:solidFill>
+              <a:srgbClr val="FF0000"/>
+            </a:solidFill>
+            <a:tailEnd type="triangle"/>
+          </a:ln>
+        </p:spPr>
+        <p:style>
+          <a:lnRef idx="2">
+            <a:schemeClr val="accent1"/>
+          </a:lnRef>
+          <a:fillRef idx="0">
+            <a:schemeClr val="accent1"/>
+          </a:fillRef>
+          <a:effectRef idx="1">
+            <a:schemeClr val="accent1"/>
+          </a:effectRef>
+          <a:fontRef idx="minor">
+            <a:schemeClr val="tx1"/>
+          </a:fontRef>
+        </p:style>
+      </p:cxnSp>
+      <p:cxnSp>
+        <p:nvCxnSpPr>
+          <p:cNvPr id="17" name="Straight Arrow Connector 16">
+            <a:extLst>
+              <a:ext uri="{FF2B5EF4-FFF2-40B4-BE49-F238E27FC236}">
+                <a16:creationId xmlns:a16="http://schemas.microsoft.com/office/drawing/2014/main" id="{96C18D26-EA67-D38A-6023-6ABB0E2EA7E9}"/>
+              </a:ext>
+            </a:extLst>
+          </p:cNvPr>
+          <p:cNvCxnSpPr>
+            <a:cxnSpLocks/>
+          </p:cNvCxnSpPr>
+          <p:nvPr/>
+        </p:nvCxnSpPr>
+        <p:spPr>
+          <a:xfrm flipH="1" flipV="1">
+            <a:off x="6419086" y="3053614"/>
+            <a:ext cx="720638" cy="333431"/>
+          </a:xfrm>
+          <a:prstGeom prst="straightConnector1">
+            <a:avLst/>
+          </a:prstGeom>
+          <a:ln>
+            <a:solidFill>
+              <a:srgbClr val="FF0000"/>
+            </a:solidFill>
+            <a:tailEnd type="triangle"/>
+          </a:ln>
+        </p:spPr>
+        <p:style>
+          <a:lnRef idx="2">
+            <a:schemeClr val="accent1"/>
+          </a:lnRef>
+          <a:fillRef idx="0">
+            <a:schemeClr val="accent1"/>
+          </a:fillRef>
+          <a:effectRef idx="1">
+            <a:schemeClr val="accent1"/>
+          </a:effectRef>
+          <a:fontRef idx="minor">
+            <a:schemeClr val="tx1"/>
+          </a:fontRef>
+        </p:style>
+      </p:cxnSp>
+      <p:cxnSp>
+        <p:nvCxnSpPr>
+          <p:cNvPr id="19" name="Straight Arrow Connector 18">
+            <a:extLst>
+              <a:ext uri="{FF2B5EF4-FFF2-40B4-BE49-F238E27FC236}">
+                <a16:creationId xmlns:a16="http://schemas.microsoft.com/office/drawing/2014/main" id="{ADB08FA2-8435-38B8-500C-64231F2C2888}"/>
+              </a:ext>
+            </a:extLst>
+          </p:cNvPr>
+          <p:cNvCxnSpPr>
+            <a:cxnSpLocks/>
+          </p:cNvCxnSpPr>
+          <p:nvPr/>
+        </p:nvCxnSpPr>
+        <p:spPr>
+          <a:xfrm flipH="1" flipV="1">
+            <a:off x="6419083" y="3303687"/>
+            <a:ext cx="720640" cy="250073"/>
+          </a:xfrm>
+          <a:prstGeom prst="straightConnector1">
+            <a:avLst/>
+          </a:prstGeom>
+          <a:ln>
+            <a:solidFill>
+              <a:srgbClr val="FF0000"/>
+            </a:solidFill>
+            <a:tailEnd type="triangle"/>
+          </a:ln>
+        </p:spPr>
+        <p:style>
+          <a:lnRef idx="2">
+            <a:schemeClr val="accent1"/>
+          </a:lnRef>
+          <a:fillRef idx="0">
+            <a:schemeClr val="accent1"/>
+          </a:fillRef>
+          <a:effectRef idx="1">
+            <a:schemeClr val="accent1"/>
+          </a:effectRef>
+          <a:fontRef idx="minor">
+            <a:schemeClr val="tx1"/>
+          </a:fontRef>
+        </p:style>
+      </p:cxnSp>
+      <p:cxnSp>
+        <p:nvCxnSpPr>
+          <p:cNvPr id="21" name="Straight Arrow Connector 20">
+            <a:extLst>
+              <a:ext uri="{FF2B5EF4-FFF2-40B4-BE49-F238E27FC236}">
+                <a16:creationId xmlns:a16="http://schemas.microsoft.com/office/drawing/2014/main" id="{05BA95FB-D9EE-76F6-415B-CDCB2320A4CA}"/>
+              </a:ext>
+            </a:extLst>
+          </p:cNvPr>
+          <p:cNvCxnSpPr>
+            <a:cxnSpLocks/>
+          </p:cNvCxnSpPr>
+          <p:nvPr/>
+        </p:nvCxnSpPr>
+        <p:spPr>
+          <a:xfrm flipH="1" flipV="1">
+            <a:off x="6434057" y="3553760"/>
+            <a:ext cx="688027" cy="165974"/>
+          </a:xfrm>
+          <a:prstGeom prst="straightConnector1">
+            <a:avLst/>
+          </a:prstGeom>
+          <a:ln>
+            <a:solidFill>
+              <a:srgbClr val="FF0000"/>
+            </a:solidFill>
+            <a:tailEnd type="triangle"/>
+          </a:ln>
+        </p:spPr>
+        <p:style>
+          <a:lnRef idx="2">
+            <a:schemeClr val="accent1"/>
+          </a:lnRef>
+          <a:fillRef idx="0">
+            <a:schemeClr val="accent1"/>
+          </a:fillRef>
+          <a:effectRef idx="1">
+            <a:schemeClr val="accent1"/>
+          </a:effectRef>
+          <a:fontRef idx="minor">
+            <a:schemeClr val="tx1"/>
+          </a:fontRef>
+        </p:style>
+      </p:cxnSp>
+      <p:cxnSp>
+        <p:nvCxnSpPr>
+          <p:cNvPr id="23" name="Straight Arrow Connector 22">
+            <a:extLst>
+              <a:ext uri="{FF2B5EF4-FFF2-40B4-BE49-F238E27FC236}">
+                <a16:creationId xmlns:a16="http://schemas.microsoft.com/office/drawing/2014/main" id="{3A6AE278-0AE9-6E83-8B72-6ED29C8F04E7}"/>
+              </a:ext>
+            </a:extLst>
+          </p:cNvPr>
+          <p:cNvCxnSpPr>
+            <a:cxnSpLocks/>
+          </p:cNvCxnSpPr>
+          <p:nvPr/>
+        </p:nvCxnSpPr>
+        <p:spPr>
+          <a:xfrm flipH="1" flipV="1">
+            <a:off x="6434057" y="3774252"/>
+            <a:ext cx="673053" cy="127524"/>
+          </a:xfrm>
+          <a:prstGeom prst="straightConnector1">
+            <a:avLst/>
+          </a:prstGeom>
+          <a:ln>
+            <a:solidFill>
+              <a:srgbClr val="FF0000"/>
+            </a:solidFill>
+            <a:tailEnd type="triangle"/>
+          </a:ln>
+        </p:spPr>
+        <p:style>
+          <a:lnRef idx="2">
+            <a:schemeClr val="accent1"/>
+          </a:lnRef>
+          <a:fillRef idx="0">
+            <a:schemeClr val="accent1"/>
+          </a:fillRef>
+          <a:effectRef idx="1">
+            <a:schemeClr val="accent1"/>
+          </a:effectRef>
+          <a:fontRef idx="minor">
+            <a:schemeClr val="tx1"/>
+          </a:fontRef>
+        </p:style>
+      </p:cxnSp>
+      <p:cxnSp>
+        <p:nvCxnSpPr>
+          <p:cNvPr id="25" name="Straight Arrow Connector 24">
+            <a:extLst>
+              <a:ext uri="{FF2B5EF4-FFF2-40B4-BE49-F238E27FC236}">
+                <a16:creationId xmlns:a16="http://schemas.microsoft.com/office/drawing/2014/main" id="{C9C74C4E-4610-FBEB-AD80-EF765E16A4FD}"/>
+              </a:ext>
+            </a:extLst>
+          </p:cNvPr>
+          <p:cNvCxnSpPr>
+            <a:cxnSpLocks/>
+          </p:cNvCxnSpPr>
+          <p:nvPr/>
+        </p:nvCxnSpPr>
+        <p:spPr>
+          <a:xfrm flipH="1">
+            <a:off x="6434057" y="4057764"/>
+            <a:ext cx="714486" cy="0"/>
+          </a:xfrm>
+          <a:prstGeom prst="straightConnector1">
+            <a:avLst/>
+          </a:prstGeom>
+          <a:ln>
+            <a:solidFill>
+              <a:srgbClr val="FF0000"/>
+            </a:solidFill>
+            <a:tailEnd type="triangle"/>
+          </a:ln>
+        </p:spPr>
+        <p:style>
+          <a:lnRef idx="2">
+            <a:schemeClr val="accent1"/>
+          </a:lnRef>
+          <a:fillRef idx="0">
+            <a:schemeClr val="accent1"/>
+          </a:fillRef>
+          <a:effectRef idx="1">
+            <a:schemeClr val="accent1"/>
+          </a:effectRef>
+          <a:fontRef idx="minor">
+            <a:schemeClr val="tx1"/>
+          </a:fontRef>
+        </p:style>
+      </p:cxnSp>
+      <p:cxnSp>
+        <p:nvCxnSpPr>
+          <p:cNvPr id="27" name="Straight Arrow Connector 26">
+            <a:extLst>
+              <a:ext uri="{FF2B5EF4-FFF2-40B4-BE49-F238E27FC236}">
+                <a16:creationId xmlns:a16="http://schemas.microsoft.com/office/drawing/2014/main" id="{122E37BE-DC83-E958-9354-6D45EC75CD98}"/>
+              </a:ext>
+            </a:extLst>
+          </p:cNvPr>
+          <p:cNvCxnSpPr>
+            <a:cxnSpLocks/>
+          </p:cNvCxnSpPr>
+          <p:nvPr/>
+        </p:nvCxnSpPr>
+        <p:spPr>
+          <a:xfrm flipH="1" flipV="1">
+            <a:off x="6434057" y="1970437"/>
+            <a:ext cx="704331" cy="1071689"/>
+          </a:xfrm>
+          <a:prstGeom prst="straightConnector1">
+            <a:avLst/>
+          </a:prstGeom>
+          <a:ln>
+            <a:solidFill>
+              <a:srgbClr val="FF0000"/>
+            </a:solidFill>
+            <a:tailEnd type="triangle"/>
+          </a:ln>
+        </p:spPr>
+        <p:style>
+          <a:lnRef idx="2">
+            <a:schemeClr val="accent1"/>
+          </a:lnRef>
+          <a:fillRef idx="0">
+            <a:schemeClr val="accent1"/>
+          </a:fillRef>
+          <a:effectRef idx="1">
+            <a:schemeClr val="accent1"/>
+          </a:effectRef>
+          <a:fontRef idx="minor">
+            <a:schemeClr val="tx1"/>
+          </a:fontRef>
+        </p:style>
+      </p:cxnSp>
+      <p:sp>
+        <p:nvSpPr>
+          <p:cNvPr id="29" name="Rectangle 28">
+            <a:extLst>
+              <a:ext uri="{FF2B5EF4-FFF2-40B4-BE49-F238E27FC236}">
+                <a16:creationId xmlns:a16="http://schemas.microsoft.com/office/drawing/2014/main" id="{57EA3A18-3AD0-DD63-C0BA-776373FAB7C9}"/>
+              </a:ext>
+            </a:extLst>
+          </p:cNvPr>
+          <p:cNvSpPr/>
+          <p:nvPr/>
+        </p:nvSpPr>
+        <p:spPr>
+          <a:xfrm>
+            <a:off x="617539" y="2114108"/>
+            <a:ext cx="5971032" cy="307207"/>
+          </a:xfrm>
+          <a:prstGeom prst="rect">
+            <a:avLst/>
+          </a:prstGeom>
+          <a:noFill/>
+        </p:spPr>
+        <p:style>
+          <a:lnRef idx="2">
+            <a:schemeClr val="accent1">
+              <a:shade val="15000"/>
+            </a:schemeClr>
+          </a:lnRef>
+          <a:fillRef idx="1">
+            <a:schemeClr val="accent1"/>
+          </a:fillRef>
+          <a:effectRef idx="0">
+            <a:schemeClr val="accent1"/>
+          </a:effectRef>
+          <a:fontRef idx="minor">
+            <a:schemeClr val="lt1"/>
+          </a:fontRef>
+        </p:style>
+        <p:txBody>
+          <a:bodyPr rtlCol="0" anchor="ctr"/>
+          <a:lstStyle/>
+          <a:p>
+            <a:pPr algn="ctr"/>
+            <a:endParaRPr lang="fr-CH"/>
+          </a:p>
+        </p:txBody>
+      </p:sp>
+      <p:sp>
+        <p:nvSpPr>
+          <p:cNvPr id="30" name="TextBox 29">
+            <a:extLst>
+              <a:ext uri="{FF2B5EF4-FFF2-40B4-BE49-F238E27FC236}">
+                <a16:creationId xmlns:a16="http://schemas.microsoft.com/office/drawing/2014/main" id="{452F2F16-7FDA-DAA3-DAFE-FCF397BAD3B3}"/>
+              </a:ext>
+            </a:extLst>
+          </p:cNvPr>
+          <p:cNvSpPr txBox="1"/>
+          <p:nvPr/>
+        </p:nvSpPr>
+        <p:spPr>
+          <a:xfrm>
+            <a:off x="-112582" y="2006101"/>
+            <a:ext cx="1298753" cy="261610"/>
+          </a:xfrm>
+          <a:prstGeom prst="rect">
+            <a:avLst/>
+          </a:prstGeom>
+          <a:noFill/>
+        </p:spPr>
+        <p:txBody>
+          <a:bodyPr wrap="none" rtlCol="0">
+            <a:spAutoFit/>
+          </a:bodyPr>
+          <a:lstStyle/>
+          <a:p>
+            <a:r>
+              <a:rPr lang="fr-FR" sz="1100" dirty="0"/>
+              <a:t>Use in </a:t>
+            </a:r>
+            <a:r>
+              <a:rPr lang="fr-FR" sz="1100" dirty="0" err="1"/>
+              <a:t>Fileting</a:t>
+            </a:r>
+            <a:r>
+              <a:rPr lang="fr-FR" sz="1100" dirty="0"/>
+              <a:t> GUI</a:t>
+            </a:r>
+            <a:endParaRPr lang="fr-CH" sz="1100" dirty="0"/>
+          </a:p>
+        </p:txBody>
+      </p:sp>
+    </p:spTree>
+    <p:extLst>
+      <p:ext uri="{BB962C8B-B14F-4D97-AF65-F5344CB8AC3E}">
+        <p14:creationId xmlns:p14="http://schemas.microsoft.com/office/powerpoint/2010/main" val="4158531754"/>
+      </p:ext>
+    </p:extLst>
+  </p:cSld>
+  <p:clrMapOvr>
+    <a:masterClrMapping/>
+  </p:clrMapOvr>
+</p:sld>
+</file>
+
 <file path=ppt/theme/theme1.xml><?xml version="1.0" encoding="utf-8"?>
 <a:theme xmlns:a="http://schemas.openxmlformats.org/drawingml/2006/main" name="Office Theme">
   <a:themeElements>

</xml_diff>